<commit_message>
- Updated "of" to "or" in getting started across all katas - Implemented draft for EADD kata #2 - Ad-hoc pptx updates
</commit_message>
<xml_diff>
--- a/workshops/event-api-deep-dive/event-api-deep-dive.pptx
+++ b/workshops/event-api-deep-dive/event-api-deep-dive.pptx
@@ -3064,7 +3064,7 @@
           <a:p>
             <a:fld id="{F540F470-726F-426E-889A-8E92A4693460}" type="datetimeFigureOut">
               <a:rPr lang="en-GB" smtClean="0"/>
-              <a:t>22/06/2022</a:t>
+              <a:t>11/07/2022</a:t>
             </a:fld>
             <a:endParaRPr lang="en-GB" dirty="0"/>
           </a:p>
@@ -3234,7 +3234,7 @@
             <a:fld id="{CD72A38B-F9FA-4036-A084-652409E98F08}" type="datetimeFigureOut">
               <a:rPr lang="en-GB" smtClean="0"/>
               <a:pPr/>
-              <a:t>22/06/2022</a:t>
+              <a:t>11/07/2022</a:t>
             </a:fld>
             <a:endParaRPr lang="en-GB" dirty="0"/>
           </a:p>
@@ -3983,18 +3983,7 @@
               <a:buFontTx/>
               <a:buNone/>
             </a:pPr>
-            <a:r>
-              <a:rPr lang="en-US" dirty="0"/>
-              <a:t>TODO: Postman + </a:t>
-            </a:r>
-            <a:r>
-              <a:rPr lang="en-US" dirty="0" err="1"/>
-              <a:t>AsyncAPI</a:t>
-            </a:r>
-            <a:r>
-              <a:rPr lang="en-US" dirty="0"/>
-              <a:t> kata</a:t>
-            </a:r>
+            <a:endParaRPr lang="en-US" dirty="0"/>
           </a:p>
         </p:txBody>
       </p:sp>
@@ -4554,14 +4543,7 @@
           <a:bodyPr/>
           <a:lstStyle/>
           <a:p>
-            <a:r>
-              <a:rPr lang="en-US" dirty="0" err="1"/>
-              <a:t>Websocat</a:t>
-            </a:r>
-            <a:r>
-              <a:rPr lang="en-US" dirty="0"/>
-              <a:t> demo</a:t>
-            </a:r>
+            <a:endParaRPr lang="en-US" dirty="0"/>
           </a:p>
         </p:txBody>
       </p:sp>
@@ -5178,48 +5160,7 @@
               <a:buFontTx/>
               <a:buNone/>
             </a:pPr>
-            <a:r>
-              <a:rPr lang="en-US" dirty="0"/>
-              <a:t>TODO: long-polling kata</a:t>
-            </a:r>
-          </a:p>
-          <a:p>
-            <a:pPr marL="0" indent="0">
-              <a:buFontTx/>
-              <a:buNone/>
-            </a:pPr>
-            <a:r>
-              <a:rPr lang="en-US" dirty="0"/>
-              <a:t>TODO: SSE kata</a:t>
-            </a:r>
-          </a:p>
-          <a:p>
-            <a:pPr marL="0" indent="0">
-              <a:buFontTx/>
-              <a:buNone/>
-            </a:pPr>
-            <a:r>
-              <a:rPr lang="en-US" dirty="0"/>
-              <a:t>TODO: WS kata</a:t>
-            </a:r>
-          </a:p>
-          <a:p>
-            <a:pPr marL="0" indent="0">
-              <a:buFontTx/>
-              <a:buNone/>
-            </a:pPr>
-            <a:r>
-              <a:rPr lang="en-US" dirty="0"/>
-              <a:t>STRETCH: </a:t>
-            </a:r>
-            <a:r>
-              <a:rPr lang="en-US" dirty="0" err="1"/>
-              <a:t>gRPC</a:t>
-            </a:r>
-            <a:r>
-              <a:rPr lang="en-US" dirty="0"/>
-              <a:t> kata</a:t>
-            </a:r>
+            <a:endParaRPr lang="en-US" dirty="0"/>
           </a:p>
         </p:txBody>
       </p:sp>
@@ -6329,7 +6270,7 @@
           <a:p>
             <a:fld id="{CAE15A36-EF7C-49E1-9E28-DC0261021B88}" type="datetime4">
               <a:rPr lang="en-GB" smtClean="0"/>
-              <a:t>22 June 2022</a:t>
+              <a:t>11 July 2022</a:t>
             </a:fld>
             <a:endParaRPr lang="en-GB" dirty="0"/>
           </a:p>
@@ -6832,7 +6773,7 @@
           <a:p>
             <a:fld id="{73A80043-8D1A-4EE7-8835-0FA45918CF0B}" type="datetime4">
               <a:rPr lang="en-GB" smtClean="0"/>
-              <a:t>22 June 2022</a:t>
+              <a:t>11 July 2022</a:t>
             </a:fld>
             <a:endParaRPr lang="en-GB" dirty="0"/>
           </a:p>
@@ -15358,7 +15299,7 @@
           <a:p>
             <a:fld id="{61C39D88-A2D2-46EF-88AA-9A0C8DF2E827}" type="datetime4">
               <a:rPr lang="en-GB" smtClean="0"/>
-              <a:t>22 June 2022</a:t>
+              <a:t>11 July 2022</a:t>
             </a:fld>
             <a:endParaRPr lang="en-GB" dirty="0"/>
           </a:p>
@@ -16745,7 +16686,7 @@
           <a:p>
             <a:fld id="{E66F39FE-A71C-4EA9-B6A2-49D418A61827}" type="datetimeFigureOut">
               <a:rPr lang="en-US" smtClean="0"/>
-              <a:t>6/22/2022</a:t>
+              <a:t>7/11/2022</a:t>
             </a:fld>
             <a:endParaRPr lang="en-US"/>
           </a:p>
@@ -20526,7 +20467,7 @@
           <a:p>
             <a:fld id="{A98DB34D-784C-4D9C-ABD8-61F63F762187}" type="datetime4">
               <a:rPr lang="en-GB" smtClean="0"/>
-              <a:t>22 June 2022</a:t>
+              <a:t>11 July 2022</a:t>
             </a:fld>
             <a:endParaRPr lang="en-GB" dirty="0"/>
           </a:p>
@@ -29491,7 +29432,7 @@
             <a:lstStyle/>
             <a:p>
               <a:pPr algn="ctr"/>
-              <a:endParaRPr lang="en-US" sz="1225"/>
+              <a:endParaRPr lang="en-US" sz="1225" dirty="0"/>
             </a:p>
           </p:txBody>
         </p:sp>

</xml_diff>

<commit_message>
Finished Event API Deep-dive
</commit_message>
<xml_diff>
--- a/workshops/event-api-deep-dive/event-api-deep-dive.pptx
+++ b/workshops/event-api-deep-dive/event-api-deep-dive.pptx
@@ -3064,7 +3064,7 @@
           <a:p>
             <a:fld id="{F540F470-726F-426E-889A-8E92A4693460}" type="datetimeFigureOut">
               <a:rPr lang="en-GB" smtClean="0"/>
-              <a:t>11/07/2022</a:t>
+              <a:t>12/07/2022</a:t>
             </a:fld>
             <a:endParaRPr lang="en-GB" dirty="0"/>
           </a:p>
@@ -3234,7 +3234,7 @@
             <a:fld id="{CD72A38B-F9FA-4036-A084-652409E98F08}" type="datetimeFigureOut">
               <a:rPr lang="en-GB" smtClean="0"/>
               <a:pPr/>
-              <a:t>11/07/2022</a:t>
+              <a:t>12/07/2022</a:t>
             </a:fld>
             <a:endParaRPr lang="en-GB" dirty="0"/>
           </a:p>
@@ -4344,36 +4344,7 @@
               <a:tabLst/>
               <a:defRPr/>
             </a:pPr>
-            <a:r>
-              <a:rPr lang="en-US" dirty="0"/>
-              <a:t>TODO: </a:t>
-            </a:r>
-            <a:r>
-              <a:rPr lang="en-US" dirty="0" err="1"/>
-              <a:t>kcat</a:t>
-            </a:r>
-            <a:r>
-              <a:rPr lang="en-US" dirty="0"/>
-              <a:t> kata</a:t>
-            </a:r>
-          </a:p>
-          <a:p>
-            <a:pPr marL="0" indent="0">
-              <a:buFontTx/>
-              <a:buNone/>
-            </a:pPr>
-            <a:r>
-              <a:rPr lang="en-US" dirty="0"/>
-              <a:t>TODO: </a:t>
-            </a:r>
-            <a:r>
-              <a:rPr lang="en-US" dirty="0" err="1"/>
-              <a:t>wscat</a:t>
-            </a:r>
-            <a:r>
-              <a:rPr lang="en-US" dirty="0"/>
-              <a:t> kata</a:t>
-            </a:r>
+            <a:endParaRPr lang="en-US" dirty="0"/>
           </a:p>
         </p:txBody>
       </p:sp>
@@ -6270,7 +6241,7 @@
           <a:p>
             <a:fld id="{CAE15A36-EF7C-49E1-9E28-DC0261021B88}" type="datetime4">
               <a:rPr lang="en-GB" smtClean="0"/>
-              <a:t>11 July 2022</a:t>
+              <a:t>12 July 2022</a:t>
             </a:fld>
             <a:endParaRPr lang="en-GB" dirty="0"/>
           </a:p>
@@ -6773,7 +6744,7 @@
           <a:p>
             <a:fld id="{73A80043-8D1A-4EE7-8835-0FA45918CF0B}" type="datetime4">
               <a:rPr lang="en-GB" smtClean="0"/>
-              <a:t>11 July 2022</a:t>
+              <a:t>12 July 2022</a:t>
             </a:fld>
             <a:endParaRPr lang="en-GB" dirty="0"/>
           </a:p>
@@ -15299,7 +15270,7 @@
           <a:p>
             <a:fld id="{61C39D88-A2D2-46EF-88AA-9A0C8DF2E827}" type="datetime4">
               <a:rPr lang="en-GB" smtClean="0"/>
-              <a:t>11 July 2022</a:t>
+              <a:t>12 July 2022</a:t>
             </a:fld>
             <a:endParaRPr lang="en-GB" dirty="0"/>
           </a:p>
@@ -16686,7 +16657,7 @@
           <a:p>
             <a:fld id="{E66F39FE-A71C-4EA9-B6A2-49D418A61827}" type="datetimeFigureOut">
               <a:rPr lang="en-US" smtClean="0"/>
-              <a:t>7/11/2022</a:t>
+              <a:t>7/12/2022</a:t>
             </a:fld>
             <a:endParaRPr lang="en-US"/>
           </a:p>
@@ -20467,7 +20438,7 @@
           <a:p>
             <a:fld id="{A98DB34D-784C-4D9C-ABD8-61F63F762187}" type="datetime4">
               <a:rPr lang="en-GB" smtClean="0"/>
-              <a:t>11 July 2022</a:t>
+              <a:t>12 July 2022</a:t>
             </a:fld>
             <a:endParaRPr lang="en-GB" dirty="0"/>
           </a:p>
@@ -31760,15 +31731,6 @@
 </file>
 
 <file path=customXml/item1.xml><?xml version="1.0" encoding="utf-8"?>
-<?mso-contentType ?>
-<FormTemplates xmlns="http://schemas.microsoft.com/sharepoint/v3/contenttype/forms">
-  <Display>DocumentLibraryForm</Display>
-  <Edit>DocumentLibraryForm</Edit>
-  <New>DocumentLibraryForm</New>
-</FormTemplates>
-</file>
-
-<file path=customXml/item2.xml><?xml version="1.0" encoding="utf-8"?>
 <ct:contentTypeSchema xmlns:ct="http://schemas.microsoft.com/office/2006/metadata/contentType" xmlns:ma="http://schemas.microsoft.com/office/2006/metadata/properties/metaAttributes" ct:_="" ma:_="" ma:contentTypeName="Dokument" ma:contentTypeID="0x010100F65BD4264CB9094CA7944F610D2D7DCA" ma:contentTypeVersion="7" ma:contentTypeDescription="Opret et nyt dokument." ma:contentTypeScope="" ma:versionID="285eed63ac2e046b8ebe16ddc91dee82">
   <xsd:schema xmlns:xsd="http://www.w3.org/2001/XMLSchema" xmlns:xs="http://www.w3.org/2001/XMLSchema" xmlns:p="http://schemas.microsoft.com/office/2006/metadata/properties" xmlns:ns2="2279a1a0-7112-41f8-b496-d9a5c3576fb0" xmlns:ns3="95c0be1d-4093-4789-923d-5b0c8c8304dc" targetNamespace="http://schemas.microsoft.com/office/2006/metadata/properties" ma:root="true" ma:fieldsID="92b7f3ae194bb82c73e460576e55bd12" ns2:_="" ns3:_="">
     <xsd:import namespace="2279a1a0-7112-41f8-b496-d9a5c3576fb0"/>
@@ -31953,6 +31915,15 @@
 </ct:contentTypeSchema>
 </file>
 
+<file path=customXml/item2.xml><?xml version="1.0" encoding="utf-8"?>
+<?mso-contentType ?>
+<FormTemplates xmlns="http://schemas.microsoft.com/sharepoint/v3/contenttype/forms">
+  <Display>DocumentLibraryForm</Display>
+  <Edit>DocumentLibraryForm</Edit>
+  <New>DocumentLibraryForm</New>
+</FormTemplates>
+</file>
+
 <file path=customXml/item3.xml><?xml version="1.0" encoding="utf-8"?>
 <p:properties xmlns:p="http://schemas.microsoft.com/office/2006/metadata/properties" xmlns:xsi="http://www.w3.org/2001/XMLSchema-instance" xmlns:pc="http://schemas.microsoft.com/office/infopath/2007/PartnerControls">
   <documentManagement/>
@@ -31960,14 +31931,6 @@
 </file>
 
 <file path=customXml/itemProps1.xml><?xml version="1.0" encoding="utf-8"?>
-<ds:datastoreItem xmlns:ds="http://schemas.openxmlformats.org/officeDocument/2006/customXml" ds:itemID="{4273EE10-C1B2-449B-9085-39965BA21A56}">
-  <ds:schemaRefs>
-    <ds:schemaRef ds:uri="http://schemas.microsoft.com/sharepoint/v3/contenttype/forms"/>
-  </ds:schemaRefs>
-</ds:datastoreItem>
-</file>
-
-<file path=customXml/itemProps2.xml><?xml version="1.0" encoding="utf-8"?>
 <ds:datastoreItem xmlns:ds="http://schemas.openxmlformats.org/officeDocument/2006/customXml" ds:itemID="{D4EFA56C-2770-467D-8E59-C07C9A9CC313}">
   <ds:schemaRefs>
     <ds:schemaRef ds:uri="http://schemas.microsoft.com/office/2006/metadata/contentType"/>
@@ -31986,6 +31949,14 @@
 </ds:datastoreItem>
 </file>
 
+<file path=customXml/itemProps2.xml><?xml version="1.0" encoding="utf-8"?>
+<ds:datastoreItem xmlns:ds="http://schemas.openxmlformats.org/officeDocument/2006/customXml" ds:itemID="{4273EE10-C1B2-449B-9085-39965BA21A56}">
+  <ds:schemaRefs>
+    <ds:schemaRef ds:uri="http://schemas.microsoft.com/sharepoint/v3/contenttype/forms"/>
+  </ds:schemaRefs>
+</ds:datastoreItem>
+</file>
+
 <file path=customXml/itemProps3.xml><?xml version="1.0" encoding="utf-8"?>
 <ds:datastoreItem xmlns:ds="http://schemas.openxmlformats.org/officeDocument/2006/customXml" ds:itemID="{B61EE2CA-DCC7-45E5-87C8-6789A166AF77}">
   <ds:schemaRefs>

</xml_diff>